<commit_message>
Add Devops > docker / 가상화와 컨테이너
</commit_message>
<xml_diff>
--- a/Article/DevOps/도커설치_기본명령어/img/img.pptx
+++ b/Article/DevOps/도커설치_기본명령어/img/img.pptx
@@ -6,6 +6,10 @@
   </p:sldMasterIdLst>
   <p:sldIdLst>
     <p:sldId id="256" r:id="rId2"/>
+    <p:sldId id="257" r:id="rId3"/>
+    <p:sldId id="258" r:id="rId4"/>
+    <p:sldId id="259" r:id="rId5"/>
+    <p:sldId id="260" r:id="rId6"/>
   </p:sldIdLst>
   <p:sldSz cx="12192000" cy="6858000"/>
   <p:notesSz cx="6858000" cy="9144000"/>
@@ -104,6 +108,11 @@
       </a:defRPr>
     </a:lvl9pPr>
   </p:defaultTextStyle>
+  <p:extLst>
+    <p:ext uri="{EFAFB233-063F-42B5-8137-9DF3F51BA10A}">
+      <p15:sldGuideLst xmlns:p15="http://schemas.microsoft.com/office/powerpoint/2012/main"/>
+    </p:ext>
+  </p:extLst>
 </p:presentation>
 </file>
 
@@ -3321,10 +3330,220 @@
           <a:chExt cx="0" cy="0"/>
         </a:xfrm>
       </p:grpSpPr>
+      <p:pic>
+        <p:nvPicPr>
+          <p:cNvPr id="2" name="그림 1">
+            <a:extLst>
+              <a:ext uri="{FF2B5EF4-FFF2-40B4-BE49-F238E27FC236}">
+                <a16:creationId xmlns:a16="http://schemas.microsoft.com/office/drawing/2014/main" id="{C6DCD625-1F22-47ED-833D-1A94341925C6}"/>
+              </a:ext>
+            </a:extLst>
+          </p:cNvPr>
+          <p:cNvPicPr>
+            <a:picLocks noChangeAspect="1"/>
+          </p:cNvPicPr>
+          <p:nvPr/>
+        </p:nvPicPr>
+        <p:blipFill>
+          <a:blip r:embed="rId2"/>
+          <a:stretch>
+            <a:fillRect/>
+          </a:stretch>
+        </p:blipFill>
+        <p:spPr>
+          <a:xfrm>
+            <a:off x="1125700" y="202200"/>
+            <a:ext cx="10952000" cy="6160500"/>
+          </a:xfrm>
+          <a:prstGeom prst="rect">
+            <a:avLst/>
+          </a:prstGeom>
+        </p:spPr>
+      </p:pic>
     </p:spTree>
     <p:extLst>
       <p:ext uri="{BB962C8B-B14F-4D97-AF65-F5344CB8AC3E}">
         <p14:creationId xmlns:p14="http://schemas.microsoft.com/office/powerpoint/2010/main" val="3331126486"/>
+      </p:ext>
+    </p:extLst>
+  </p:cSld>
+  <p:clrMapOvr>
+    <a:masterClrMapping/>
+  </p:clrMapOvr>
+</p:sld>
+</file>
+
+<file path=ppt/slides/slide2.xml><?xml version="1.0" encoding="utf-8"?>
+<p:sld xmlns:a="http://schemas.openxmlformats.org/drawingml/2006/main" xmlns:r="http://schemas.openxmlformats.org/officeDocument/2006/relationships" xmlns:p="http://schemas.openxmlformats.org/presentationml/2006/main">
+  <p:cSld>
+    <p:spTree>
+      <p:nvGrpSpPr>
+        <p:cNvPr id="1" name=""/>
+        <p:cNvGrpSpPr/>
+        <p:nvPr/>
+      </p:nvGrpSpPr>
+      <p:grpSpPr>
+        <a:xfrm>
+          <a:off x="0" y="0"/>
+          <a:ext cx="0" cy="0"/>
+          <a:chOff x="0" y="0"/>
+          <a:chExt cx="0" cy="0"/>
+        </a:xfrm>
+      </p:grpSpPr>
+      <p:pic>
+        <p:nvPicPr>
+          <p:cNvPr id="4" name="그림 3">
+            <a:extLst>
+              <a:ext uri="{FF2B5EF4-FFF2-40B4-BE49-F238E27FC236}">
+                <a16:creationId xmlns:a16="http://schemas.microsoft.com/office/drawing/2014/main" id="{682D4929-F311-42D6-846A-D53F07FB8356}"/>
+              </a:ext>
+            </a:extLst>
+          </p:cNvPr>
+          <p:cNvPicPr>
+            <a:picLocks noChangeAspect="1"/>
+          </p:cNvPicPr>
+          <p:nvPr/>
+        </p:nvPicPr>
+        <p:blipFill>
+          <a:blip r:embed="rId2"/>
+          <a:stretch>
+            <a:fillRect/>
+          </a:stretch>
+        </p:blipFill>
+        <p:spPr>
+          <a:xfrm>
+            <a:off x="2485636" y="996723"/>
+            <a:ext cx="5147161" cy="4582983"/>
+          </a:xfrm>
+          <a:prstGeom prst="rect">
+            <a:avLst/>
+          </a:prstGeom>
+        </p:spPr>
+      </p:pic>
+    </p:spTree>
+    <p:extLst>
+      <p:ext uri="{BB962C8B-B14F-4D97-AF65-F5344CB8AC3E}">
+        <p14:creationId xmlns:p14="http://schemas.microsoft.com/office/powerpoint/2010/main" val="2478179641"/>
+      </p:ext>
+    </p:extLst>
+  </p:cSld>
+  <p:clrMapOvr>
+    <a:masterClrMapping/>
+  </p:clrMapOvr>
+</p:sld>
+</file>
+
+<file path=ppt/slides/slide3.xml><?xml version="1.0" encoding="utf-8"?>
+<p:sld xmlns:a="http://schemas.openxmlformats.org/drawingml/2006/main" xmlns:r="http://schemas.openxmlformats.org/officeDocument/2006/relationships" xmlns:p="http://schemas.openxmlformats.org/presentationml/2006/main">
+  <p:cSld>
+    <p:spTree>
+      <p:nvGrpSpPr>
+        <p:cNvPr id="1" name=""/>
+        <p:cNvGrpSpPr/>
+        <p:nvPr/>
+      </p:nvGrpSpPr>
+      <p:grpSpPr>
+        <a:xfrm>
+          <a:off x="0" y="0"/>
+          <a:ext cx="0" cy="0"/>
+          <a:chOff x="0" y="0"/>
+          <a:chExt cx="0" cy="0"/>
+        </a:xfrm>
+      </p:grpSpPr>
+      <p:pic>
+        <p:nvPicPr>
+          <p:cNvPr id="2" name="그림 1">
+            <a:extLst>
+              <a:ext uri="{FF2B5EF4-FFF2-40B4-BE49-F238E27FC236}">
+                <a16:creationId xmlns:a16="http://schemas.microsoft.com/office/drawing/2014/main" id="{32C8CBBE-E443-433B-81AF-006803D5568B}"/>
+              </a:ext>
+            </a:extLst>
+          </p:cNvPr>
+          <p:cNvPicPr>
+            <a:picLocks noChangeAspect="1"/>
+          </p:cNvPicPr>
+          <p:nvPr/>
+        </p:nvPicPr>
+        <p:blipFill>
+          <a:blip r:embed="rId2"/>
+          <a:stretch>
+            <a:fillRect/>
+          </a:stretch>
+        </p:blipFill>
+        <p:spPr>
+          <a:xfrm>
+            <a:off x="2733675" y="1100137"/>
+            <a:ext cx="6724650" cy="4657725"/>
+          </a:xfrm>
+          <a:prstGeom prst="rect">
+            <a:avLst/>
+          </a:prstGeom>
+        </p:spPr>
+      </p:pic>
+    </p:spTree>
+    <p:extLst>
+      <p:ext uri="{BB962C8B-B14F-4D97-AF65-F5344CB8AC3E}">
+        <p14:creationId xmlns:p14="http://schemas.microsoft.com/office/powerpoint/2010/main" val="2064561194"/>
+      </p:ext>
+    </p:extLst>
+  </p:cSld>
+  <p:clrMapOvr>
+    <a:masterClrMapping/>
+  </p:clrMapOvr>
+</p:sld>
+</file>
+
+<file path=ppt/slides/slide4.xml><?xml version="1.0" encoding="utf-8"?>
+<p:sld xmlns:a="http://schemas.openxmlformats.org/drawingml/2006/main" xmlns:r="http://schemas.openxmlformats.org/officeDocument/2006/relationships" xmlns:p="http://schemas.openxmlformats.org/presentationml/2006/main">
+  <p:cSld>
+    <p:spTree>
+      <p:nvGrpSpPr>
+        <p:cNvPr id="1" name=""/>
+        <p:cNvGrpSpPr/>
+        <p:nvPr/>
+      </p:nvGrpSpPr>
+      <p:grpSpPr>
+        <a:xfrm>
+          <a:off x="0" y="0"/>
+          <a:ext cx="0" cy="0"/>
+          <a:chOff x="0" y="0"/>
+          <a:chExt cx="0" cy="0"/>
+        </a:xfrm>
+      </p:grpSpPr>
+    </p:spTree>
+    <p:extLst>
+      <p:ext uri="{BB962C8B-B14F-4D97-AF65-F5344CB8AC3E}">
+        <p14:creationId xmlns:p14="http://schemas.microsoft.com/office/powerpoint/2010/main" val="161909482"/>
+      </p:ext>
+    </p:extLst>
+  </p:cSld>
+  <p:clrMapOvr>
+    <a:masterClrMapping/>
+  </p:clrMapOvr>
+</p:sld>
+</file>
+
+<file path=ppt/slides/slide5.xml><?xml version="1.0" encoding="utf-8"?>
+<p:sld xmlns:a="http://schemas.openxmlformats.org/drawingml/2006/main" xmlns:r="http://schemas.openxmlformats.org/officeDocument/2006/relationships" xmlns:p="http://schemas.openxmlformats.org/presentationml/2006/main">
+  <p:cSld>
+    <p:spTree>
+      <p:nvGrpSpPr>
+        <p:cNvPr id="1" name=""/>
+        <p:cNvGrpSpPr/>
+        <p:nvPr/>
+      </p:nvGrpSpPr>
+      <p:grpSpPr>
+        <a:xfrm>
+          <a:off x="0" y="0"/>
+          <a:ext cx="0" cy="0"/>
+          <a:chOff x="0" y="0"/>
+          <a:chExt cx="0" cy="0"/>
+        </a:xfrm>
+      </p:grpSpPr>
+    </p:spTree>
+    <p:extLst>
+      <p:ext uri="{BB962C8B-B14F-4D97-AF65-F5344CB8AC3E}">
+        <p14:creationId xmlns:p14="http://schemas.microsoft.com/office/powerpoint/2010/main" val="2500225504"/>
       </p:ext>
     </p:extLst>
   </p:cSld>

</xml_diff>